<commit_message>
Updated ResizeLab documentation and example ppt files
</commit_message>
<xml_diff>
--- a/doc/Documentation Resource-ResizeLab.pptx
+++ b/doc/Documentation Resource-ResizeLab.pptx
@@ -5,7 +5,7 @@
     <p:sldMasterId id="2147483648" r:id="rId1"/>
   </p:sldMasterIdLst>
   <p:notesMasterIdLst>
-    <p:notesMasterId r:id="rId34"/>
+    <p:notesMasterId r:id="rId35"/>
   </p:notesMasterIdLst>
   <p:sldIdLst>
     <p:sldId id="257" r:id="rId2"/>
@@ -38,8 +38,9 @@
     <p:sldId id="264" r:id="rId29"/>
     <p:sldId id="289" r:id="rId30"/>
     <p:sldId id="297" r:id="rId31"/>
-    <p:sldId id="295" r:id="rId32"/>
-    <p:sldId id="298" r:id="rId33"/>
+    <p:sldId id="299" r:id="rId32"/>
+    <p:sldId id="295" r:id="rId33"/>
+    <p:sldId id="298" r:id="rId34"/>
   </p:sldIdLst>
   <p:sldSz cx="12192000" cy="6858000"/>
   <p:notesSz cx="6858000" cy="9144000"/>
@@ -201,6 +202,7 @@
             <p14:sldId id="264"/>
             <p14:sldId id="289"/>
             <p14:sldId id="297"/>
+            <p14:sldId id="299"/>
             <p14:sldId id="295"/>
             <p14:sldId id="298"/>
           </p14:sldIdLst>
@@ -296,7 +298,7 @@
           <a:p>
             <a:fld id="{2E15B72F-BDD6-4BDE-B5F4-C2835099BBE8}" type="datetimeFigureOut">
               <a:rPr lang="en-US" smtClean="0"/>
-              <a:t>5/4/2016</a:t>
+              <a:t>5/19/2016</a:t>
             </a:fld>
             <a:endParaRPr lang="en-US"/>
           </a:p>
@@ -2357,41 +2359,6 @@
               <a:defRPr/>
             </a:pPr>
             <a:r>
-              <a:rPr lang="en-US" dirty="0" smtClean="0"/>
-              <a:t>Lock</a:t>
-            </a:r>
-            <a:r>
-              <a:rPr lang="en-US" baseline="0" dirty="0" smtClean="0"/>
-              <a:t> a</a:t>
-            </a:r>
-            <a:r>
-              <a:rPr lang="en-US" dirty="0" smtClean="0"/>
-              <a:t>spect</a:t>
-            </a:r>
-            <a:r>
-              <a:rPr lang="en-US" baseline="0" dirty="0" smtClean="0"/>
-              <a:t> ratio</a:t>
-            </a:r>
-          </a:p>
-          <a:p>
-            <a:pPr marL="171450" marR="0" indent="-171450" algn="l" defTabSz="914400" rtl="0" eaLnBrk="1" fontAlgn="auto" latinLnBrk="0" hangingPunct="1">
-              <a:lnSpc>
-                <a:spcPct val="100000"/>
-              </a:lnSpc>
-              <a:spcBef>
-                <a:spcPts val="0"/>
-              </a:spcBef>
-              <a:spcAft>
-                <a:spcPts val="0"/>
-              </a:spcAft>
-              <a:buClrTx/>
-              <a:buSzTx/>
-              <a:buFont typeface="Arial" panose="020B0604020202020204" pitchFamily="34" charset="0"/>
-              <a:buChar char="•"/>
-              <a:tabLst/>
-              <a:defRPr/>
-            </a:pPr>
-            <a:r>
               <a:rPr lang="en-US" baseline="0" dirty="0" smtClean="0"/>
               <a:t>Anchor bottom center</a:t>
             </a:r>
@@ -2501,41 +2468,6 @@
         <p:txBody>
           <a:bodyPr/>
           <a:lstStyle/>
-          <a:p>
-            <a:pPr marL="171450" marR="0" indent="-171450" algn="l" defTabSz="914400" rtl="0" eaLnBrk="1" fontAlgn="auto" latinLnBrk="0" hangingPunct="1">
-              <a:lnSpc>
-                <a:spcPct val="100000"/>
-              </a:lnSpc>
-              <a:spcBef>
-                <a:spcPts val="0"/>
-              </a:spcBef>
-              <a:spcAft>
-                <a:spcPts val="0"/>
-              </a:spcAft>
-              <a:buClrTx/>
-              <a:buSzTx/>
-              <a:buFont typeface="Arial" panose="020B0604020202020204" pitchFamily="34" charset="0"/>
-              <a:buChar char="•"/>
-              <a:tabLst/>
-              <a:defRPr/>
-            </a:pPr>
-            <a:r>
-              <a:rPr lang="en-US" dirty="0" smtClean="0"/>
-              <a:t>Lock</a:t>
-            </a:r>
-            <a:r>
-              <a:rPr lang="en-US" baseline="0" dirty="0" smtClean="0"/>
-              <a:t> a</a:t>
-            </a:r>
-            <a:r>
-              <a:rPr lang="en-US" dirty="0" smtClean="0"/>
-              <a:t>spect</a:t>
-            </a:r>
-            <a:r>
-              <a:rPr lang="en-US" baseline="0" dirty="0" smtClean="0"/>
-              <a:t> ratio</a:t>
-            </a:r>
-          </a:p>
           <a:p>
             <a:pPr marL="171450" marR="0" indent="-171450" algn="l" defTabSz="914400" rtl="0" eaLnBrk="1" fontAlgn="auto" latinLnBrk="0" hangingPunct="1">
               <a:lnSpc>
@@ -2755,7 +2687,7 @@
           <a:p>
             <a:fld id="{D5753E2F-842D-4479-8A88-7B79949A13DE}" type="datetimeFigureOut">
               <a:rPr lang="en-US" smtClean="0"/>
-              <a:t>5/4/2016</a:t>
+              <a:t>5/19/2016</a:t>
             </a:fld>
             <a:endParaRPr lang="en-US"/>
           </a:p>
@@ -2925,7 +2857,7 @@
           <a:p>
             <a:fld id="{D5753E2F-842D-4479-8A88-7B79949A13DE}" type="datetimeFigureOut">
               <a:rPr lang="en-US" smtClean="0"/>
-              <a:t>5/4/2016</a:t>
+              <a:t>5/19/2016</a:t>
             </a:fld>
             <a:endParaRPr lang="en-US"/>
           </a:p>
@@ -3105,7 +3037,7 @@
           <a:p>
             <a:fld id="{D5753E2F-842D-4479-8A88-7B79949A13DE}" type="datetimeFigureOut">
               <a:rPr lang="en-US" smtClean="0"/>
-              <a:t>5/4/2016</a:t>
+              <a:t>5/19/2016</a:t>
             </a:fld>
             <a:endParaRPr lang="en-US"/>
           </a:p>
@@ -3275,7 +3207,7 @@
           <a:p>
             <a:fld id="{D5753E2F-842D-4479-8A88-7B79949A13DE}" type="datetimeFigureOut">
               <a:rPr lang="en-US" smtClean="0"/>
-              <a:t>5/4/2016</a:t>
+              <a:t>5/19/2016</a:t>
             </a:fld>
             <a:endParaRPr lang="en-US"/>
           </a:p>
@@ -3521,7 +3453,7 @@
           <a:p>
             <a:fld id="{D5753E2F-842D-4479-8A88-7B79949A13DE}" type="datetimeFigureOut">
               <a:rPr lang="en-US" smtClean="0"/>
-              <a:t>5/4/2016</a:t>
+              <a:t>5/19/2016</a:t>
             </a:fld>
             <a:endParaRPr lang="en-US"/>
           </a:p>
@@ -3753,7 +3685,7 @@
           <a:p>
             <a:fld id="{D5753E2F-842D-4479-8A88-7B79949A13DE}" type="datetimeFigureOut">
               <a:rPr lang="en-US" smtClean="0"/>
-              <a:t>5/4/2016</a:t>
+              <a:t>5/19/2016</a:t>
             </a:fld>
             <a:endParaRPr lang="en-US"/>
           </a:p>
@@ -4120,7 +4052,7 @@
           <a:p>
             <a:fld id="{D5753E2F-842D-4479-8A88-7B79949A13DE}" type="datetimeFigureOut">
               <a:rPr lang="en-US" smtClean="0"/>
-              <a:t>5/4/2016</a:t>
+              <a:t>5/19/2016</a:t>
             </a:fld>
             <a:endParaRPr lang="en-US"/>
           </a:p>
@@ -4238,7 +4170,7 @@
           <a:p>
             <a:fld id="{D5753E2F-842D-4479-8A88-7B79949A13DE}" type="datetimeFigureOut">
               <a:rPr lang="en-US" smtClean="0"/>
-              <a:t>5/4/2016</a:t>
+              <a:t>5/19/2016</a:t>
             </a:fld>
             <a:endParaRPr lang="en-US"/>
           </a:p>
@@ -4333,7 +4265,7 @@
           <a:p>
             <a:fld id="{D5753E2F-842D-4479-8A88-7B79949A13DE}" type="datetimeFigureOut">
               <a:rPr lang="en-US" smtClean="0"/>
-              <a:t>5/4/2016</a:t>
+              <a:t>5/19/2016</a:t>
             </a:fld>
             <a:endParaRPr lang="en-US"/>
           </a:p>
@@ -4610,7 +4542,7 @@
           <a:p>
             <a:fld id="{D5753E2F-842D-4479-8A88-7B79949A13DE}" type="datetimeFigureOut">
               <a:rPr lang="en-US" smtClean="0"/>
-              <a:t>5/4/2016</a:t>
+              <a:t>5/19/2016</a:t>
             </a:fld>
             <a:endParaRPr lang="en-US"/>
           </a:p>
@@ -4863,7 +4795,7 @@
           <a:p>
             <a:fld id="{D5753E2F-842D-4479-8A88-7B79949A13DE}" type="datetimeFigureOut">
               <a:rPr lang="en-US" smtClean="0"/>
-              <a:t>5/4/2016</a:t>
+              <a:t>5/19/2016</a:t>
             </a:fld>
             <a:endParaRPr lang="en-US"/>
           </a:p>
@@ -5076,7 +5008,7 @@
           <a:p>
             <a:fld id="{D5753E2F-842D-4479-8A88-7B79949A13DE}" type="datetimeFigureOut">
               <a:rPr lang="en-US" smtClean="0"/>
-              <a:t>5/4/2016</a:t>
+              <a:t>5/19/2016</a:t>
             </a:fld>
             <a:endParaRPr lang="en-US"/>
           </a:p>
@@ -5988,7 +5920,7 @@
       </p:grpSpPr>
       <p:sp>
         <p:nvSpPr>
-          <p:cNvPr id="3" name="Rectangle 2"/>
+          <p:cNvPr id="7" name="Rectangle 2"/>
           <p:cNvSpPr>
             <a:spLocks/>
           </p:cNvSpPr>
@@ -6038,9 +5970,9 @@
       </p:sp>
       <p:pic>
         <p:nvPicPr>
-          <p:cNvPr id="2051" name="Picture 3" descr="C:\Users\dcsdcr\AppData\Local\Microsoft\Windows\Temporary Internet Files\Content.IE5\V9KYU8FJ\1327009734[1].png"/>
+          <p:cNvPr id="8" name="Picture 3" descr="C:\Users\dcsdcr\AppData\Local\Microsoft\Windows\Temporary Internet Files\Content.IE5\V9KYU8FJ\1327009734[1].png"/>
           <p:cNvPicPr>
-            <a:picLocks noChangeAspect="1" noChangeArrowheads="1"/>
+            <a:picLocks noChangeArrowheads="1"/>
           </p:cNvPicPr>
           <p:nvPr/>
         </p:nvPicPr>
@@ -6059,8 +5991,8 @@
         </p:blipFill>
         <p:spPr bwMode="auto">
           <a:xfrm>
-            <a:off x="2944158" y="1511620"/>
-            <a:ext cx="1300462" cy="1002981"/>
+            <a:off x="2944160" y="966564"/>
+            <a:ext cx="1300461" cy="1548037"/>
           </a:xfrm>
           <a:prstGeom prst="rect">
             <a:avLst/>
@@ -6079,9 +6011,9 @@
       </p:pic>
       <p:pic>
         <p:nvPicPr>
-          <p:cNvPr id="2053" name="Picture 5" descr="C:\Users\dcsdcr\AppData\Local\Microsoft\Windows\Temporary Internet Files\Content.IE5\GG0SFF8P\box-cartone[1].png"/>
+          <p:cNvPr id="9" name="Picture 5" descr="C:\Users\dcsdcr\AppData\Local\Microsoft\Windows\Temporary Internet Files\Content.IE5\GG0SFF8P\box-cartone[1].png"/>
           <p:cNvPicPr>
-            <a:picLocks noChangeAspect="1" noChangeArrowheads="1"/>
+            <a:picLocks noChangeArrowheads="1"/>
           </p:cNvPicPr>
           <p:nvPr/>
         </p:nvPicPr>
@@ -6118,9 +6050,9 @@
       </p:pic>
       <p:pic>
         <p:nvPicPr>
-          <p:cNvPr id="2054" name="Picture 6" descr="C:\Users\dcsdcr\AppData\Local\Microsoft\Windows\Temporary Internet Files\Content.IE5\QX27U4HQ\Open-Cardboard-Box[1].png"/>
+          <p:cNvPr id="10" name="Picture 6" descr="C:\Users\dcsdcr\AppData\Local\Microsoft\Windows\Temporary Internet Files\Content.IE5\QX27U4HQ\Open-Cardboard-Box[1].png"/>
           <p:cNvPicPr>
-            <a:picLocks noChangeAspect="1" noChangeArrowheads="1"/>
+            <a:picLocks noChangeArrowheads="1"/>
           </p:cNvPicPr>
           <p:nvPr/>
         </p:nvPicPr>
@@ -6139,8 +6071,8 @@
         </p:blipFill>
         <p:spPr bwMode="auto">
           <a:xfrm>
-            <a:off x="4745762" y="1499431"/>
-            <a:ext cx="1300460" cy="1007253"/>
+            <a:off x="4745763" y="1411891"/>
+            <a:ext cx="1300461" cy="1094793"/>
           </a:xfrm>
           <a:prstGeom prst="rect">
             <a:avLst/>
@@ -6159,9 +6091,9 @@
       </p:pic>
       <p:pic>
         <p:nvPicPr>
-          <p:cNvPr id="2055" name="Picture 7" descr="C:\Users\dcsdcr\AppData\Local\Microsoft\Windows\Temporary Internet Files\Content.IE5\ERLOFNC8\open-box[1].png"/>
+          <p:cNvPr id="11" name="Picture 7" descr="C:\Users\dcsdcr\AppData\Local\Microsoft\Windows\Temporary Internet Files\Content.IE5\ERLOFNC8\open-box[1].png"/>
           <p:cNvPicPr>
-            <a:picLocks noChangeAspect="1" noChangeArrowheads="1"/>
+            <a:picLocks noChangeArrowheads="1"/>
           </p:cNvPicPr>
           <p:nvPr/>
         </p:nvPicPr>
@@ -6180,8 +6112,8 @@
         </p:blipFill>
         <p:spPr bwMode="auto">
           <a:xfrm>
-            <a:off x="8362655" y="1259656"/>
-            <a:ext cx="1300461" cy="1254945"/>
+            <a:off x="8362655" y="366468"/>
+            <a:ext cx="1300461" cy="2148132"/>
           </a:xfrm>
           <a:prstGeom prst="rect">
             <a:avLst/>
@@ -6230,7 +6162,7 @@
       </p:grpSpPr>
       <p:sp>
         <p:nvSpPr>
-          <p:cNvPr id="3" name="Rectangle 2"/>
+          <p:cNvPr id="7" name="Rectangle 2"/>
           <p:cNvSpPr>
             <a:spLocks/>
           </p:cNvSpPr>
@@ -6280,9 +6212,9 @@
       </p:sp>
       <p:pic>
         <p:nvPicPr>
-          <p:cNvPr id="2051" name="Picture 3" descr="C:\Users\dcsdcr\AppData\Local\Microsoft\Windows\Temporary Internet Files\Content.IE5\V9KYU8FJ\1327009734[1].png"/>
+          <p:cNvPr id="8" name="Picture 3" descr="C:\Users\dcsdcr\AppData\Local\Microsoft\Windows\Temporary Internet Files\Content.IE5\V9KYU8FJ\1327009734[1].png"/>
           <p:cNvPicPr>
-            <a:picLocks noChangeAspect="1" noChangeArrowheads="1"/>
+            <a:picLocks noChangeArrowheads="1"/>
           </p:cNvPicPr>
           <p:nvPr/>
         </p:nvPicPr>
@@ -6301,8 +6233,8 @@
         </p:blipFill>
         <p:spPr bwMode="auto">
           <a:xfrm>
-            <a:off x="2985548" y="1575460"/>
-            <a:ext cx="1217685" cy="939140"/>
+            <a:off x="2590801" y="1575461"/>
+            <a:ext cx="2007179" cy="939140"/>
           </a:xfrm>
           <a:prstGeom prst="rect">
             <a:avLst/>
@@ -6321,9 +6253,9 @@
       </p:pic>
       <p:pic>
         <p:nvPicPr>
-          <p:cNvPr id="2053" name="Picture 5" descr="C:\Users\dcsdcr\AppData\Local\Microsoft\Windows\Temporary Internet Files\Content.IE5\GG0SFF8P\box-cartone[1].png"/>
+          <p:cNvPr id="9" name="Picture 5" descr="C:\Users\dcsdcr\AppData\Local\Microsoft\Windows\Temporary Internet Files\Content.IE5\GG0SFF8P\box-cartone[1].png"/>
           <p:cNvPicPr>
-            <a:picLocks noChangeAspect="1" noChangeArrowheads="1"/>
+            <a:picLocks noChangeArrowheads="1"/>
           </p:cNvPicPr>
           <p:nvPr/>
         </p:nvPicPr>
@@ -6360,9 +6292,9 @@
       </p:pic>
       <p:pic>
         <p:nvPicPr>
-          <p:cNvPr id="2054" name="Picture 6" descr="C:\Users\dcsdcr\AppData\Local\Microsoft\Windows\Temporary Internet Files\Content.IE5\QX27U4HQ\Open-Cardboard-Box[1].png"/>
+          <p:cNvPr id="10" name="Picture 6" descr="C:\Users\dcsdcr\AppData\Local\Microsoft\Windows\Temporary Internet Files\Content.IE5\QX27U4HQ\Open-Cardboard-Box[1].png"/>
           <p:cNvPicPr>
-            <a:picLocks noChangeAspect="1" noChangeArrowheads="1"/>
+            <a:picLocks noChangeArrowheads="1"/>
           </p:cNvPicPr>
           <p:nvPr/>
         </p:nvPicPr>
@@ -6381,8 +6313,8 @@
         </p:blipFill>
         <p:spPr bwMode="auto">
           <a:xfrm>
-            <a:off x="4789732" y="1567543"/>
-            <a:ext cx="1212520" cy="939140"/>
+            <a:off x="4689252" y="1567544"/>
+            <a:ext cx="1413483" cy="939140"/>
           </a:xfrm>
           <a:prstGeom prst="rect">
             <a:avLst/>
@@ -6401,9 +6333,9 @@
       </p:pic>
       <p:pic>
         <p:nvPicPr>
-          <p:cNvPr id="2055" name="Picture 7" descr="C:\Users\dcsdcr\AppData\Local\Microsoft\Windows\Temporary Internet Files\Content.IE5\ERLOFNC8\open-box[1].png"/>
+          <p:cNvPr id="11" name="Picture 7" descr="C:\Users\dcsdcr\AppData\Local\Microsoft\Windows\Temporary Internet Files\Content.IE5\ERLOFNC8\open-box[1].png"/>
           <p:cNvPicPr>
-            <a:picLocks noChangeAspect="1" noChangeArrowheads="1"/>
+            <a:picLocks noChangeArrowheads="1"/>
           </p:cNvPicPr>
           <p:nvPr/>
         </p:nvPicPr>
@@ -6422,8 +6354,8 @@
         </p:blipFill>
         <p:spPr bwMode="auto">
           <a:xfrm>
-            <a:off x="8526283" y="1575460"/>
-            <a:ext cx="973202" cy="939140"/>
+            <a:off x="7899864" y="1575460"/>
+            <a:ext cx="2226043" cy="939140"/>
           </a:xfrm>
           <a:prstGeom prst="rect">
             <a:avLst/>
@@ -6472,7 +6404,7 @@
       </p:grpSpPr>
       <p:sp>
         <p:nvSpPr>
-          <p:cNvPr id="3" name="Rectangle 2"/>
+          <p:cNvPr id="7" name="Rectangle 2"/>
           <p:cNvSpPr>
             <a:spLocks/>
           </p:cNvSpPr>
@@ -6522,9 +6454,9 @@
       </p:sp>
       <p:pic>
         <p:nvPicPr>
-          <p:cNvPr id="2051" name="Picture 3" descr="C:\Users\dcsdcr\AppData\Local\Microsoft\Windows\Temporary Internet Files\Content.IE5\V9KYU8FJ\1327009734[1].png"/>
+          <p:cNvPr id="8" name="Picture 3" descr="C:\Users\dcsdcr\AppData\Local\Microsoft\Windows\Temporary Internet Files\Content.IE5\V9KYU8FJ\1327009734[1].png"/>
           <p:cNvPicPr>
-            <a:picLocks noChangeAspect="1" noChangeArrowheads="1"/>
+            <a:picLocks noChangeArrowheads="1"/>
           </p:cNvPicPr>
           <p:nvPr/>
         </p:nvPicPr>
@@ -6543,7 +6475,7 @@
         </p:blipFill>
         <p:spPr bwMode="auto">
           <a:xfrm>
-            <a:off x="2944160" y="1575460"/>
+            <a:off x="2944160" y="1575461"/>
             <a:ext cx="1300461" cy="939140"/>
           </a:xfrm>
           <a:prstGeom prst="rect">
@@ -6563,9 +6495,9 @@
       </p:pic>
       <p:pic>
         <p:nvPicPr>
-          <p:cNvPr id="2053" name="Picture 5" descr="C:\Users\dcsdcr\AppData\Local\Microsoft\Windows\Temporary Internet Files\Content.IE5\GG0SFF8P\box-cartone[1].png"/>
+          <p:cNvPr id="9" name="Picture 5" descr="C:\Users\dcsdcr\AppData\Local\Microsoft\Windows\Temporary Internet Files\Content.IE5\GG0SFF8P\box-cartone[1].png"/>
           <p:cNvPicPr>
-            <a:picLocks noChangeAspect="1" noChangeArrowheads="1"/>
+            <a:picLocks noChangeArrowheads="1"/>
           </p:cNvPicPr>
           <p:nvPr/>
         </p:nvPicPr>
@@ -6602,9 +6534,9 @@
       </p:pic>
       <p:pic>
         <p:nvPicPr>
-          <p:cNvPr id="2054" name="Picture 6" descr="C:\Users\dcsdcr\AppData\Local\Microsoft\Windows\Temporary Internet Files\Content.IE5\QX27U4HQ\Open-Cardboard-Box[1].png"/>
+          <p:cNvPr id="10" name="Picture 6" descr="C:\Users\dcsdcr\AppData\Local\Microsoft\Windows\Temporary Internet Files\Content.IE5\QX27U4HQ\Open-Cardboard-Box[1].png"/>
           <p:cNvPicPr>
-            <a:picLocks noChangeAspect="1" noChangeArrowheads="1"/>
+            <a:picLocks noChangeArrowheads="1"/>
           </p:cNvPicPr>
           <p:nvPr/>
         </p:nvPicPr>
@@ -6623,7 +6555,7 @@
         </p:blipFill>
         <p:spPr bwMode="auto">
           <a:xfrm>
-            <a:off x="4745763" y="1567543"/>
+            <a:off x="4745763" y="1567544"/>
             <a:ext cx="1300461" cy="939140"/>
           </a:xfrm>
           <a:prstGeom prst="rect">
@@ -6643,9 +6575,9 @@
       </p:pic>
       <p:pic>
         <p:nvPicPr>
-          <p:cNvPr id="2055" name="Picture 7" descr="C:\Users\dcsdcr\AppData\Local\Microsoft\Windows\Temporary Internet Files\Content.IE5\ERLOFNC8\open-box[1].png"/>
+          <p:cNvPr id="11" name="Picture 7" descr="C:\Users\dcsdcr\AppData\Local\Microsoft\Windows\Temporary Internet Files\Content.IE5\ERLOFNC8\open-box[1].png"/>
           <p:cNvPicPr>
-            <a:picLocks noChangeAspect="1" noChangeArrowheads="1"/>
+            <a:picLocks noChangeArrowheads="1"/>
           </p:cNvPicPr>
           <p:nvPr/>
         </p:nvPicPr>
@@ -7713,9 +7645,9 @@
       </p:pic>
       <p:pic>
         <p:nvPicPr>
-          <p:cNvPr id="3" name="Picture 2"/>
+          <p:cNvPr id="1026" name="Picture 2" descr="https://lh4.googleusercontent.com/MdmFuNh1Yas9CTbhCUrcSs_RAEGIW4WjyOU27Qgin5Vfq4BycJxIu3HG0Nr8t7T5r01XCyZx2O5syjayftQMl615sKuJ9wLCAs1d11h4UC5vzhVQ-HJFqQF9PXHDlV4biluIZSLP"/>
           <p:cNvPicPr>
-            <a:picLocks noChangeAspect="1"/>
+            <a:picLocks noChangeAspect="1" noChangeArrowheads="1"/>
           </p:cNvPicPr>
           <p:nvPr/>
         </p:nvPicPr>
@@ -7727,42 +7659,29 @@
               </a:ext>
             </a:extLst>
           </a:blip>
+          <a:srcRect/>
           <a:stretch>
             <a:fillRect/>
           </a:stretch>
         </p:blipFill>
-        <p:spPr>
-          <a:xfrm>
-            <a:off x="4882339" y="1690688"/>
-            <a:ext cx="3333774" cy="1476386"/>
-          </a:xfrm>
-          <a:prstGeom prst="rect">
-            <a:avLst/>
-          </a:prstGeom>
-        </p:spPr>
-      </p:pic>
-      <p:pic>
-        <p:nvPicPr>
-          <p:cNvPr id="4" name="Picture 3"/>
-          <p:cNvPicPr>
-            <a:picLocks noChangeAspect="1"/>
-          </p:cNvPicPr>
-          <p:nvPr/>
-        </p:nvPicPr>
-        <p:blipFill>
-          <a:blip r:embed="rId8"/>
-          <a:stretch>
-            <a:fillRect/>
-          </a:stretch>
-        </p:blipFill>
-        <p:spPr>
-          <a:xfrm>
-            <a:off x="4853788" y="3273541"/>
-            <a:ext cx="3362325" cy="1504950"/>
-          </a:xfrm>
-          <a:prstGeom prst="rect">
-            <a:avLst/>
-          </a:prstGeom>
+        <p:spPr bwMode="auto">
+          <a:xfrm>
+            <a:off x="4773850" y="2085300"/>
+            <a:ext cx="3371850" cy="1514475"/>
+          </a:xfrm>
+          <a:prstGeom prst="rect">
+            <a:avLst/>
+          </a:prstGeom>
+          <a:noFill/>
+          <a:extLst>
+            <a:ext uri="{909E8E84-426E-40DD-AFC4-6F175D3DCCD1}">
+              <a14:hiddenFill xmlns:a14="http://schemas.microsoft.com/office/drawing/2010/main">
+                <a:solidFill>
+                  <a:srgbClr val="FFFFFF"/>
+                </a:solidFill>
+              </a14:hiddenFill>
+            </a:ext>
+          </a:extLst>
         </p:spPr>
       </p:pic>
     </p:spTree>
@@ -7970,28 +7889,22 @@
       </p:pic>
       <p:pic>
         <p:nvPicPr>
-          <p:cNvPr id="2" name="Picture 1"/>
+          <p:cNvPr id="3" name="Picture 2"/>
           <p:cNvPicPr>
             <a:picLocks noChangeAspect="1"/>
           </p:cNvPicPr>
           <p:nvPr/>
         </p:nvPicPr>
         <p:blipFill>
-          <a:blip r:embed="rId7">
-            <a:extLst>
-              <a:ext uri="{28A0092B-C50C-407E-A947-70E740481C1C}">
-                <a14:useLocalDpi xmlns:a14="http://schemas.microsoft.com/office/drawing/2010/main" val="0"/>
-              </a:ext>
-            </a:extLst>
-          </a:blip>
+          <a:blip r:embed="rId7"/>
           <a:stretch>
             <a:fillRect/>
           </a:stretch>
         </p:blipFill>
         <p:spPr>
           <a:xfrm>
-            <a:off x="4468456" y="1690688"/>
-            <a:ext cx="2857521" cy="1476386"/>
+            <a:off x="4875912" y="2133770"/>
+            <a:ext cx="2905125" cy="1514475"/>
           </a:xfrm>
           <a:prstGeom prst="rect">
             <a:avLst/>
@@ -9661,28 +9574,22 @@
       </p:pic>
       <p:pic>
         <p:nvPicPr>
-          <p:cNvPr id="3" name="Picture 2"/>
+          <p:cNvPr id="7" name="Picture 6"/>
           <p:cNvPicPr>
             <a:picLocks noChangeAspect="1"/>
           </p:cNvPicPr>
           <p:nvPr/>
         </p:nvPicPr>
         <p:blipFill>
-          <a:blip r:embed="rId5">
-            <a:extLst>
-              <a:ext uri="{28A0092B-C50C-407E-A947-70E740481C1C}">
-                <a14:useLocalDpi xmlns:a14="http://schemas.microsoft.com/office/drawing/2010/main" val="0"/>
-              </a:ext>
-            </a:extLst>
-          </a:blip>
+          <a:blip r:embed="rId5"/>
           <a:stretch>
             <a:fillRect/>
           </a:stretch>
         </p:blipFill>
         <p:spPr>
           <a:xfrm>
-            <a:off x="4285576" y="1690688"/>
-            <a:ext cx="2857521" cy="2047890"/>
+            <a:off x="4426461" y="1776421"/>
+            <a:ext cx="2905125" cy="2076450"/>
           </a:xfrm>
           <a:prstGeom prst="rect">
             <a:avLst/>
@@ -9879,28 +9786,22 @@
       </p:pic>
       <p:pic>
         <p:nvPicPr>
-          <p:cNvPr id="3" name="Picture 2"/>
+          <p:cNvPr id="7" name="Picture 6"/>
           <p:cNvPicPr>
             <a:picLocks noChangeAspect="1"/>
           </p:cNvPicPr>
           <p:nvPr/>
         </p:nvPicPr>
         <p:blipFill>
-          <a:blip r:embed="rId6">
-            <a:extLst>
-              <a:ext uri="{28A0092B-C50C-407E-A947-70E740481C1C}">
-                <a14:useLocalDpi xmlns:a14="http://schemas.microsoft.com/office/drawing/2010/main" val="0"/>
-              </a:ext>
-            </a:extLst>
-          </a:blip>
+          <a:blip r:embed="rId6"/>
           <a:stretch>
             <a:fillRect/>
           </a:stretch>
         </p:blipFill>
         <p:spPr>
           <a:xfrm>
-            <a:off x="3315222" y="4466714"/>
-            <a:ext cx="2857521" cy="2047890"/>
+            <a:off x="3520022" y="4397715"/>
+            <a:ext cx="2914650" cy="2105025"/>
           </a:xfrm>
           <a:prstGeom prst="rect">
             <a:avLst/>
@@ -14179,11 +14080,11 @@
             <a:avLst/>
           </a:prstGeom>
           <a:solidFill>
-            <a:srgbClr val="ED7D31"/>
+            <a:srgbClr val="EAD511"/>
           </a:solidFill>
           <a:ln>
             <a:solidFill>
-              <a:srgbClr val="ED7D31"/>
+              <a:srgbClr val="EAD511"/>
             </a:solidFill>
           </a:ln>
         </p:spPr>
@@ -14280,11 +14181,11 @@
             <a:avLst/>
           </a:prstGeom>
           <a:solidFill>
-            <a:srgbClr val="ED7D31"/>
+            <a:srgbClr val="EAD511"/>
           </a:solidFill>
           <a:ln>
             <a:solidFill>
-              <a:srgbClr val="ED7D31"/>
+              <a:srgbClr val="EAD511"/>
             </a:solidFill>
           </a:ln>
         </p:spPr>
@@ -14381,11 +14282,11 @@
             <a:avLst/>
           </a:prstGeom>
           <a:solidFill>
-            <a:srgbClr val="ED7D31"/>
+            <a:srgbClr val="EAD511"/>
           </a:solidFill>
           <a:ln>
             <a:solidFill>
-              <a:srgbClr val="ED7D31"/>
+              <a:srgbClr val="EAD511"/>
             </a:solidFill>
           </a:ln>
         </p:spPr>
@@ -14482,11 +14383,11 @@
             <a:avLst/>
           </a:prstGeom>
           <a:solidFill>
-            <a:srgbClr val="ED7D31"/>
+            <a:srgbClr val="EAD511"/>
           </a:solidFill>
           <a:ln>
             <a:solidFill>
-              <a:srgbClr val="ED7D31"/>
+              <a:srgbClr val="EAD511"/>
             </a:solidFill>
           </a:ln>
         </p:spPr>
@@ -14583,11 +14484,11 @@
             <a:avLst/>
           </a:prstGeom>
           <a:solidFill>
-            <a:srgbClr val="ED7D31"/>
+            <a:srgbClr val="EAD511"/>
           </a:solidFill>
           <a:ln>
             <a:solidFill>
-              <a:srgbClr val="ED7D31"/>
+              <a:srgbClr val="EAD511"/>
             </a:solidFill>
           </a:ln>
         </p:spPr>
@@ -14684,11 +14585,11 @@
             <a:avLst/>
           </a:prstGeom>
           <a:solidFill>
-            <a:srgbClr val="ED7D31"/>
+            <a:srgbClr val="EAD511"/>
           </a:solidFill>
           <a:ln>
             <a:solidFill>
-              <a:srgbClr val="ED7D31"/>
+              <a:srgbClr val="EAD511"/>
             </a:solidFill>
           </a:ln>
         </p:spPr>
@@ -14785,11 +14686,11 @@
             <a:avLst/>
           </a:prstGeom>
           <a:solidFill>
-            <a:srgbClr val="ED7D31"/>
+            <a:srgbClr val="EAD511"/>
           </a:solidFill>
           <a:ln>
             <a:solidFill>
-              <a:srgbClr val="ED7D31"/>
+              <a:srgbClr val="EAD511"/>
             </a:solidFill>
           </a:ln>
         </p:spPr>
@@ -14886,11 +14787,11 @@
             <a:avLst/>
           </a:prstGeom>
           <a:solidFill>
-            <a:srgbClr val="ED7D31"/>
+            <a:srgbClr val="EAD511"/>
           </a:solidFill>
           <a:ln>
             <a:solidFill>
-              <a:srgbClr val="ED7D31"/>
+              <a:srgbClr val="EAD511"/>
             </a:solidFill>
           </a:ln>
         </p:spPr>
@@ -14987,11 +14888,11 @@
             <a:avLst/>
           </a:prstGeom>
           <a:solidFill>
-            <a:srgbClr val="ED7D31"/>
+            <a:srgbClr val="EAD511"/>
           </a:solidFill>
           <a:ln>
             <a:solidFill>
-              <a:srgbClr val="ED7D31"/>
+              <a:srgbClr val="EAD511"/>
             </a:solidFill>
           </a:ln>
         </p:spPr>
@@ -15110,41 +15011,16 @@
       </p:grpSpPr>
       <p:sp>
         <p:nvSpPr>
-          <p:cNvPr id="2" name="Title 1"/>
-          <p:cNvSpPr>
-            <a:spLocks noGrp="1"/>
-          </p:cNvSpPr>
-          <p:nvPr>
-            <p:ph type="title"/>
-          </p:nvPr>
-        </p:nvSpPr>
-        <p:spPr/>
-        <p:txBody>
-          <a:bodyPr/>
-          <a:lstStyle/>
-          <a:p>
-            <a:r>
-              <a:rPr lang="en-US" dirty="0" smtClean="0"/>
-              <a:t>Example</a:t>
-            </a:r>
-            <a:endParaRPr lang="en-US" dirty="0"/>
-          </a:p>
-        </p:txBody>
-      </p:sp>
-      <p:sp>
-        <p:nvSpPr>
-          <p:cNvPr id="10" name="Oval 9"/>
-          <p:cNvSpPr>
-            <a:spLocks/>
-          </p:cNvSpPr>
-          <p:nvPr/>
-        </p:nvSpPr>
-        <p:spPr>
-          <a:xfrm rot="2700000">
-            <a:off x="2961122" y="3228486"/>
-            <a:ext cx="914400" cy="914400"/>
-          </a:xfrm>
-          <a:prstGeom prst="ellipse">
+          <p:cNvPr id="5" name="Left Arrow 4"/>
+          <p:cNvSpPr/>
+          <p:nvPr/>
+        </p:nvSpPr>
+        <p:spPr>
+          <a:xfrm rot="8126086">
+            <a:off x="5899149" y="2936835"/>
+            <a:ext cx="958450" cy="811203"/>
+          </a:xfrm>
+          <a:prstGeom prst="leftArrow">
             <a:avLst/>
           </a:prstGeom>
           <a:solidFill>
@@ -15189,13 +15065,77 @@
       </p:sp>
       <p:sp>
         <p:nvSpPr>
-          <p:cNvPr id="11" name="Left Arrow 10"/>
+          <p:cNvPr id="10" name="TextBox 9"/>
+          <p:cNvSpPr txBox="1"/>
+          <p:nvPr/>
+        </p:nvSpPr>
+        <p:spPr>
+          <a:xfrm rot="2700000">
+            <a:off x="6461678" y="2702428"/>
+            <a:ext cx="922047" cy="253916"/>
+          </a:xfrm>
+          <a:prstGeom prst="rect">
+            <a:avLst/>
+          </a:prstGeom>
+          <a:noFill/>
+        </p:spPr>
+        <p:txBody>
+          <a:bodyPr wrap="none" rtlCol="0">
+            <a:spAutoFit/>
+          </a:bodyPr>
+          <a:lstStyle/>
+          <a:p>
+            <a:r>
+              <a:rPr lang="en-US" sz="1000" dirty="0" smtClean="0"/>
+              <a:t>Actual Height</a:t>
+            </a:r>
+            <a:endParaRPr lang="en-US" sz="1000" dirty="0"/>
+          </a:p>
+        </p:txBody>
+      </p:sp>
+      <p:cxnSp>
+        <p:nvCxnSpPr>
+          <p:cNvPr id="11" name="Straight Arrow Connector 10"/>
+          <p:cNvCxnSpPr/>
+          <p:nvPr/>
+        </p:nvCxnSpPr>
+        <p:spPr>
+          <a:xfrm rot="18900000" flipH="1">
+            <a:off x="6794216" y="2520270"/>
+            <a:ext cx="10288" cy="838200"/>
+          </a:xfrm>
+          <a:prstGeom prst="straightConnector1">
+            <a:avLst/>
+          </a:prstGeom>
+          <a:ln>
+            <a:headEnd type="triangle"/>
+            <a:tailEnd type="triangle"/>
+          </a:ln>
+        </p:spPr>
+        <p:style>
+          <a:lnRef idx="1">
+            <a:schemeClr val="accent1"/>
+          </a:lnRef>
+          <a:fillRef idx="0">
+            <a:schemeClr val="accent1"/>
+          </a:fillRef>
+          <a:effectRef idx="0">
+            <a:schemeClr val="accent1"/>
+          </a:effectRef>
+          <a:fontRef idx="minor">
+            <a:schemeClr val="tx1"/>
+          </a:fontRef>
+        </p:style>
+      </p:cxnSp>
+      <p:sp>
+        <p:nvSpPr>
+          <p:cNvPr id="14" name="Left Arrow 13"/>
           <p:cNvSpPr/>
           <p:nvPr/>
         </p:nvSpPr>
         <p:spPr>
-          <a:xfrm rot="2726086">
-            <a:off x="2220673" y="2550673"/>
+          <a:xfrm rot="21576158">
+            <a:off x="3176069" y="3010779"/>
             <a:ext cx="958450" cy="811203"/>
           </a:xfrm>
           <a:prstGeom prst="leftArrow">
@@ -15243,13 +15183,77 @@
       </p:sp>
       <p:sp>
         <p:nvSpPr>
-          <p:cNvPr id="13" name="Left Arrow 12"/>
+          <p:cNvPr id="15" name="TextBox 14"/>
+          <p:cNvSpPr txBox="1"/>
+          <p:nvPr/>
+        </p:nvSpPr>
+        <p:spPr>
+          <a:xfrm rot="16150072">
+            <a:off x="2446349" y="3278167"/>
+            <a:ext cx="922047" cy="253916"/>
+          </a:xfrm>
+          <a:prstGeom prst="rect">
+            <a:avLst/>
+          </a:prstGeom>
+          <a:noFill/>
+        </p:spPr>
+        <p:txBody>
+          <a:bodyPr wrap="none" rtlCol="0">
+            <a:spAutoFit/>
+          </a:bodyPr>
+          <a:lstStyle/>
+          <a:p>
+            <a:r>
+              <a:rPr lang="en-US" sz="1000" dirty="0" smtClean="0"/>
+              <a:t>Actual Height</a:t>
+            </a:r>
+            <a:endParaRPr lang="en-US" sz="1000" dirty="0"/>
+          </a:p>
+        </p:txBody>
+      </p:sp>
+      <p:cxnSp>
+        <p:nvCxnSpPr>
+          <p:cNvPr id="16" name="Straight Arrow Connector 15"/>
+          <p:cNvCxnSpPr/>
+          <p:nvPr/>
+        </p:nvCxnSpPr>
+        <p:spPr>
+          <a:xfrm rot="10750072" flipH="1">
+            <a:off x="3067334" y="2993073"/>
+            <a:ext cx="10288" cy="838200"/>
+          </a:xfrm>
+          <a:prstGeom prst="straightConnector1">
+            <a:avLst/>
+          </a:prstGeom>
+          <a:ln>
+            <a:headEnd type="triangle"/>
+            <a:tailEnd type="triangle"/>
+          </a:ln>
+        </p:spPr>
+        <p:style>
+          <a:lnRef idx="1">
+            <a:schemeClr val="accent1"/>
+          </a:lnRef>
+          <a:fillRef idx="0">
+            <a:schemeClr val="accent1"/>
+          </a:fillRef>
+          <a:effectRef idx="0">
+            <a:schemeClr val="accent1"/>
+          </a:effectRef>
+          <a:fontRef idx="minor">
+            <a:schemeClr val="tx1"/>
+          </a:fontRef>
+        </p:style>
+      </p:cxnSp>
+      <p:sp>
+        <p:nvSpPr>
+          <p:cNvPr id="53" name="Left Arrow 52"/>
           <p:cNvSpPr/>
           <p:nvPr/>
         </p:nvSpPr>
         <p:spPr>
-          <a:xfrm rot="8126086">
-            <a:off x="3668505" y="2561659"/>
+          <a:xfrm rot="2717750">
+            <a:off x="4626558" y="2936544"/>
             <a:ext cx="958450" cy="811203"/>
           </a:xfrm>
           <a:prstGeom prst="leftArrow">
@@ -15297,16 +15301,730 @@
       </p:sp>
       <p:sp>
         <p:nvSpPr>
-          <p:cNvPr id="14" name="Left Arrow 13"/>
-          <p:cNvSpPr/>
-          <p:nvPr/>
-        </p:nvSpPr>
-        <p:spPr>
-          <a:xfrm rot="13526086">
-            <a:off x="3657518" y="4009492"/>
-            <a:ext cx="958450" cy="811203"/>
-          </a:xfrm>
-          <a:prstGeom prst="leftArrow">
+          <p:cNvPr id="54" name="TextBox 53"/>
+          <p:cNvSpPr txBox="1"/>
+          <p:nvPr/>
+        </p:nvSpPr>
+        <p:spPr>
+          <a:xfrm rot="18891664">
+            <a:off x="4130391" y="2672106"/>
+            <a:ext cx="922047" cy="253916"/>
+          </a:xfrm>
+          <a:prstGeom prst="rect">
+            <a:avLst/>
+          </a:prstGeom>
+          <a:noFill/>
+        </p:spPr>
+        <p:txBody>
+          <a:bodyPr wrap="none" rtlCol="0">
+            <a:spAutoFit/>
+          </a:bodyPr>
+          <a:lstStyle/>
+          <a:p>
+            <a:r>
+              <a:rPr lang="en-US" sz="1000" dirty="0" smtClean="0"/>
+              <a:t>Actual Height</a:t>
+            </a:r>
+            <a:endParaRPr lang="en-US" sz="1000" dirty="0"/>
+          </a:p>
+        </p:txBody>
+      </p:sp>
+      <p:cxnSp>
+        <p:nvCxnSpPr>
+          <p:cNvPr id="55" name="Straight Arrow Connector 54"/>
+          <p:cNvCxnSpPr/>
+          <p:nvPr/>
+        </p:nvCxnSpPr>
+        <p:spPr>
+          <a:xfrm rot="13491664" flipH="1">
+            <a:off x="4696553" y="2503038"/>
+            <a:ext cx="10288" cy="838200"/>
+          </a:xfrm>
+          <a:prstGeom prst="straightConnector1">
+            <a:avLst/>
+          </a:prstGeom>
+          <a:ln>
+            <a:headEnd type="triangle"/>
+            <a:tailEnd type="triangle"/>
+          </a:ln>
+        </p:spPr>
+        <p:style>
+          <a:lnRef idx="1">
+            <a:schemeClr val="accent1"/>
+          </a:lnRef>
+          <a:fillRef idx="0">
+            <a:schemeClr val="accent1"/>
+          </a:fillRef>
+          <a:effectRef idx="0">
+            <a:schemeClr val="accent1"/>
+          </a:effectRef>
+          <a:fontRef idx="minor">
+            <a:schemeClr val="tx1"/>
+          </a:fontRef>
+        </p:style>
+      </p:cxnSp>
+      <p:sp>
+        <p:nvSpPr>
+          <p:cNvPr id="159" name="TextBox 158"/>
+          <p:cNvSpPr txBox="1"/>
+          <p:nvPr/>
+        </p:nvSpPr>
+        <p:spPr>
+          <a:xfrm>
+            <a:off x="3509162" y="4055407"/>
+            <a:ext cx="293670" cy="246221"/>
+          </a:xfrm>
+          <a:prstGeom prst="rect">
+            <a:avLst/>
+          </a:prstGeom>
+          <a:noFill/>
+        </p:spPr>
+        <p:txBody>
+          <a:bodyPr wrap="none" rtlCol="0">
+            <a:spAutoFit/>
+          </a:bodyPr>
+          <a:lstStyle/>
+          <a:p>
+            <a:r>
+              <a:rPr lang="en-US" sz="1000" dirty="0" smtClean="0"/>
+              <a:t>0</a:t>
+            </a:r>
+            <a:r>
+              <a:rPr lang="en-US" sz="1000" dirty="0"/>
+              <a:t>°</a:t>
+            </a:r>
+            <a:endParaRPr lang="en-US" sz="1000" dirty="0"/>
+          </a:p>
+        </p:txBody>
+      </p:sp>
+      <p:sp>
+        <p:nvSpPr>
+          <p:cNvPr id="166" name="TextBox 165"/>
+          <p:cNvSpPr txBox="1"/>
+          <p:nvPr/>
+        </p:nvSpPr>
+        <p:spPr>
+          <a:xfrm>
+            <a:off x="4996677" y="4055407"/>
+            <a:ext cx="359394" cy="246221"/>
+          </a:xfrm>
+          <a:prstGeom prst="rect">
+            <a:avLst/>
+          </a:prstGeom>
+          <a:noFill/>
+        </p:spPr>
+        <p:txBody>
+          <a:bodyPr wrap="none" rtlCol="0">
+            <a:spAutoFit/>
+          </a:bodyPr>
+          <a:lstStyle/>
+          <a:p>
+            <a:r>
+              <a:rPr lang="en-US" sz="1000" dirty="0" smtClean="0"/>
+              <a:t>45°</a:t>
+            </a:r>
+            <a:endParaRPr lang="en-US" sz="1000" dirty="0"/>
+          </a:p>
+        </p:txBody>
+      </p:sp>
+      <p:sp>
+        <p:nvSpPr>
+          <p:cNvPr id="172" name="TextBox 171"/>
+          <p:cNvSpPr txBox="1"/>
+          <p:nvPr/>
+        </p:nvSpPr>
+        <p:spPr>
+          <a:xfrm>
+            <a:off x="6094661" y="4055407"/>
+            <a:ext cx="425116" cy="246221"/>
+          </a:xfrm>
+          <a:prstGeom prst="rect">
+            <a:avLst/>
+          </a:prstGeom>
+          <a:noFill/>
+        </p:spPr>
+        <p:txBody>
+          <a:bodyPr wrap="none" rtlCol="0">
+            <a:spAutoFit/>
+          </a:bodyPr>
+          <a:lstStyle/>
+          <a:p>
+            <a:r>
+              <a:rPr lang="en-US" sz="1000" dirty="0" smtClean="0"/>
+              <a:t>135°</a:t>
+            </a:r>
+            <a:endParaRPr lang="en-US" sz="1000" dirty="0"/>
+          </a:p>
+        </p:txBody>
+      </p:sp>
+      <p:grpSp>
+        <p:nvGrpSpPr>
+          <p:cNvPr id="181" name="Group 180"/>
+          <p:cNvGrpSpPr/>
+          <p:nvPr/>
+        </p:nvGrpSpPr>
+        <p:grpSpPr>
+          <a:xfrm>
+            <a:off x="8038574" y="1221253"/>
+            <a:ext cx="2231786" cy="1460464"/>
+            <a:chOff x="153477" y="4877083"/>
+            <a:chExt cx="2231786" cy="1460464"/>
+          </a:xfrm>
+        </p:grpSpPr>
+        <p:sp>
+          <p:nvSpPr>
+            <p:cNvPr id="182" name="Left Arrow 181"/>
+            <p:cNvSpPr/>
+            <p:nvPr/>
+          </p:nvSpPr>
+          <p:spPr>
+            <a:xfrm rot="8126086">
+              <a:off x="1234752" y="5445556"/>
+              <a:ext cx="958450" cy="811203"/>
+            </a:xfrm>
+            <a:prstGeom prst="leftArrow">
+              <a:avLst/>
+            </a:prstGeom>
+            <a:solidFill>
+              <a:srgbClr val="0070C0"/>
+            </a:solidFill>
+            <a:ln>
+              <a:solidFill>
+                <a:srgbClr val="0070C0"/>
+              </a:solidFill>
+            </a:ln>
+            <a:effectLst/>
+            <a:scene3d>
+              <a:camera prst="orthographicFront"/>
+              <a:lightRig rig="balanced" dir="t"/>
+            </a:scene3d>
+            <a:sp3d/>
+          </p:spPr>
+          <p:style>
+            <a:lnRef idx="2">
+              <a:schemeClr val="accent1">
+                <a:shade val="50000"/>
+              </a:schemeClr>
+            </a:lnRef>
+            <a:fillRef idx="1">
+              <a:schemeClr val="accent1"/>
+            </a:fillRef>
+            <a:effectRef idx="0">
+              <a:schemeClr val="accent1"/>
+            </a:effectRef>
+            <a:fontRef idx="minor">
+              <a:schemeClr val="lt1"/>
+            </a:fontRef>
+          </p:style>
+          <p:txBody>
+            <a:bodyPr rtlCol="0" anchor="ctr"/>
+            <a:lstStyle/>
+            <a:p>
+              <a:pPr algn="ctr"/>
+              <a:endParaRPr lang="en-US"/>
+            </a:p>
+          </p:txBody>
+        </p:sp>
+        <p:cxnSp>
+          <p:nvCxnSpPr>
+            <p:cNvPr id="183" name="Straight Connector 182"/>
+            <p:cNvCxnSpPr/>
+            <p:nvPr/>
+          </p:nvCxnSpPr>
+          <p:spPr>
+            <a:xfrm>
+              <a:off x="925436" y="5504118"/>
+              <a:ext cx="820160" cy="2381"/>
+            </a:xfrm>
+            <a:prstGeom prst="line">
+              <a:avLst/>
+            </a:prstGeom>
+            <a:ln>
+              <a:prstDash val="dash"/>
+            </a:ln>
+          </p:spPr>
+          <p:style>
+            <a:lnRef idx="1">
+              <a:schemeClr val="accent1"/>
+            </a:lnRef>
+            <a:fillRef idx="0">
+              <a:schemeClr val="accent1"/>
+            </a:fillRef>
+            <a:effectRef idx="0">
+              <a:schemeClr val="accent1"/>
+            </a:effectRef>
+            <a:fontRef idx="minor">
+              <a:schemeClr val="tx1"/>
+            </a:fontRef>
+          </p:style>
+        </p:cxnSp>
+        <p:cxnSp>
+          <p:nvCxnSpPr>
+            <p:cNvPr id="184" name="Straight Connector 183"/>
+            <p:cNvCxnSpPr/>
+            <p:nvPr/>
+          </p:nvCxnSpPr>
+          <p:spPr>
+            <a:xfrm>
+              <a:off x="925436" y="6330395"/>
+              <a:ext cx="820160" cy="2381"/>
+            </a:xfrm>
+            <a:prstGeom prst="line">
+              <a:avLst/>
+            </a:prstGeom>
+            <a:ln>
+              <a:prstDash val="dash"/>
+            </a:ln>
+          </p:spPr>
+          <p:style>
+            <a:lnRef idx="1">
+              <a:schemeClr val="accent1"/>
+            </a:lnRef>
+            <a:fillRef idx="0">
+              <a:schemeClr val="accent1"/>
+            </a:fillRef>
+            <a:effectRef idx="0">
+              <a:schemeClr val="accent1"/>
+            </a:effectRef>
+            <a:fontRef idx="minor">
+              <a:schemeClr val="tx1"/>
+            </a:fontRef>
+          </p:style>
+        </p:cxnSp>
+        <p:cxnSp>
+          <p:nvCxnSpPr>
+            <p:cNvPr id="185" name="Straight Arrow Connector 184"/>
+            <p:cNvCxnSpPr/>
+            <p:nvPr/>
+          </p:nvCxnSpPr>
+          <p:spPr>
+            <a:xfrm flipH="1">
+              <a:off x="1009132" y="5499347"/>
+              <a:ext cx="10288" cy="838200"/>
+            </a:xfrm>
+            <a:prstGeom prst="straightConnector1">
+              <a:avLst/>
+            </a:prstGeom>
+            <a:ln>
+              <a:headEnd type="triangle"/>
+              <a:tailEnd type="triangle"/>
+            </a:ln>
+          </p:spPr>
+          <p:style>
+            <a:lnRef idx="1">
+              <a:schemeClr val="accent1"/>
+            </a:lnRef>
+            <a:fillRef idx="0">
+              <a:schemeClr val="accent1"/>
+            </a:fillRef>
+            <a:effectRef idx="0">
+              <a:schemeClr val="accent1"/>
+            </a:effectRef>
+            <a:fontRef idx="minor">
+              <a:schemeClr val="tx1"/>
+            </a:fontRef>
+          </p:style>
+        </p:cxnSp>
+        <p:sp>
+          <p:nvSpPr>
+            <p:cNvPr id="186" name="TextBox 185"/>
+            <p:cNvSpPr txBox="1"/>
+            <p:nvPr/>
+          </p:nvSpPr>
+          <p:spPr>
+            <a:xfrm>
+              <a:off x="153477" y="5799132"/>
+              <a:ext cx="865943" cy="246221"/>
+            </a:xfrm>
+            <a:prstGeom prst="rect">
+              <a:avLst/>
+            </a:prstGeom>
+            <a:noFill/>
+          </p:spPr>
+          <p:txBody>
+            <a:bodyPr wrap="none" rtlCol="0">
+              <a:spAutoFit/>
+            </a:bodyPr>
+            <a:lstStyle/>
+            <a:p>
+              <a:r>
+                <a:rPr lang="en-US" sz="1000" dirty="0" smtClean="0"/>
+                <a:t>Visual Height</a:t>
+              </a:r>
+            </a:p>
+          </p:txBody>
+        </p:sp>
+        <p:sp>
+          <p:nvSpPr>
+            <p:cNvPr id="187" name="TextBox 186"/>
+            <p:cNvSpPr txBox="1"/>
+            <p:nvPr/>
+          </p:nvSpPr>
+          <p:spPr>
+            <a:xfrm rot="2700000">
+              <a:off x="1797281" y="5211149"/>
+              <a:ext cx="922047" cy="253916"/>
+            </a:xfrm>
+            <a:prstGeom prst="rect">
+              <a:avLst/>
+            </a:prstGeom>
+            <a:noFill/>
+          </p:spPr>
+          <p:txBody>
+            <a:bodyPr wrap="none" rtlCol="0">
+              <a:spAutoFit/>
+            </a:bodyPr>
+            <a:lstStyle/>
+            <a:p>
+              <a:r>
+                <a:rPr lang="en-US" sz="1000" dirty="0" smtClean="0"/>
+                <a:t>Actual Height</a:t>
+              </a:r>
+              <a:endParaRPr lang="en-US" sz="1000" dirty="0"/>
+            </a:p>
+          </p:txBody>
+        </p:sp>
+        <p:cxnSp>
+          <p:nvCxnSpPr>
+            <p:cNvPr id="188" name="Straight Arrow Connector 187"/>
+            <p:cNvCxnSpPr/>
+            <p:nvPr/>
+          </p:nvCxnSpPr>
+          <p:spPr>
+            <a:xfrm rot="-2700000" flipH="1">
+              <a:off x="2129819" y="5028991"/>
+              <a:ext cx="10288" cy="838200"/>
+            </a:xfrm>
+            <a:prstGeom prst="straightConnector1">
+              <a:avLst/>
+            </a:prstGeom>
+            <a:ln>
+              <a:headEnd type="triangle"/>
+              <a:tailEnd type="triangle"/>
+            </a:ln>
+          </p:spPr>
+          <p:style>
+            <a:lnRef idx="1">
+              <a:schemeClr val="accent1"/>
+            </a:lnRef>
+            <a:fillRef idx="0">
+              <a:schemeClr val="accent1"/>
+            </a:fillRef>
+            <a:effectRef idx="0">
+              <a:schemeClr val="accent1"/>
+            </a:effectRef>
+            <a:fontRef idx="minor">
+              <a:schemeClr val="tx1"/>
+            </a:fontRef>
+          </p:style>
+        </p:cxnSp>
+      </p:grpSp>
+      <p:grpSp>
+        <p:nvGrpSpPr>
+          <p:cNvPr id="189" name="Group 188"/>
+          <p:cNvGrpSpPr/>
+          <p:nvPr/>
+        </p:nvGrpSpPr>
+        <p:grpSpPr>
+          <a:xfrm>
+            <a:off x="8747771" y="3839764"/>
+            <a:ext cx="1326426" cy="1460004"/>
+            <a:chOff x="4606379" y="5396553"/>
+            <a:chExt cx="1326426" cy="1460004"/>
+          </a:xfrm>
+        </p:grpSpPr>
+        <p:cxnSp>
+          <p:nvCxnSpPr>
+            <p:cNvPr id="190" name="Straight Arrow Connector 189"/>
+            <p:cNvCxnSpPr/>
+            <p:nvPr/>
+          </p:nvCxnSpPr>
+          <p:spPr>
+            <a:xfrm rot="2700000" flipH="1">
+              <a:off x="5106898" y="5147435"/>
+              <a:ext cx="10288" cy="952500"/>
+            </a:xfrm>
+            <a:prstGeom prst="straightConnector1">
+              <a:avLst/>
+            </a:prstGeom>
+            <a:ln>
+              <a:headEnd type="triangle"/>
+              <a:tailEnd type="triangle"/>
+            </a:ln>
+          </p:spPr>
+          <p:style>
+            <a:lnRef idx="1">
+              <a:schemeClr val="accent1"/>
+            </a:lnRef>
+            <a:fillRef idx="0">
+              <a:schemeClr val="accent1"/>
+            </a:fillRef>
+            <a:effectRef idx="0">
+              <a:schemeClr val="accent1"/>
+            </a:effectRef>
+            <a:fontRef idx="minor">
+              <a:schemeClr val="tx1"/>
+            </a:fontRef>
+          </p:style>
+        </p:cxnSp>
+        <p:sp>
+          <p:nvSpPr>
+            <p:cNvPr id="191" name="Left Arrow 190"/>
+            <p:cNvSpPr/>
+            <p:nvPr/>
+          </p:nvSpPr>
+          <p:spPr>
+            <a:xfrm rot="8126086">
+              <a:off x="4974355" y="5572534"/>
+              <a:ext cx="958450" cy="811203"/>
+            </a:xfrm>
+            <a:prstGeom prst="leftArrow">
+              <a:avLst/>
+            </a:prstGeom>
+            <a:solidFill>
+              <a:srgbClr val="0070C0"/>
+            </a:solidFill>
+            <a:ln>
+              <a:solidFill>
+                <a:srgbClr val="0070C0"/>
+              </a:solidFill>
+            </a:ln>
+            <a:effectLst/>
+            <a:scene3d>
+              <a:camera prst="orthographicFront"/>
+              <a:lightRig rig="balanced" dir="t"/>
+            </a:scene3d>
+            <a:sp3d/>
+          </p:spPr>
+          <p:style>
+            <a:lnRef idx="2">
+              <a:schemeClr val="accent1">
+                <a:shade val="50000"/>
+              </a:schemeClr>
+            </a:lnRef>
+            <a:fillRef idx="1">
+              <a:schemeClr val="accent1"/>
+            </a:fillRef>
+            <a:effectRef idx="0">
+              <a:schemeClr val="accent1"/>
+            </a:effectRef>
+            <a:fontRef idx="minor">
+              <a:schemeClr val="lt1"/>
+            </a:fontRef>
+          </p:style>
+          <p:txBody>
+            <a:bodyPr rtlCol="0" anchor="ctr"/>
+            <a:lstStyle/>
+            <a:p>
+              <a:pPr algn="ctr"/>
+              <a:endParaRPr lang="en-US"/>
+            </a:p>
+          </p:txBody>
+        </p:sp>
+        <p:cxnSp>
+          <p:nvCxnSpPr>
+            <p:cNvPr id="192" name="Straight Connector 191"/>
+            <p:cNvCxnSpPr/>
+            <p:nvPr/>
+          </p:nvCxnSpPr>
+          <p:spPr>
+            <a:xfrm rot="5400000">
+              <a:off x="5388172" y="6285460"/>
+              <a:ext cx="820160" cy="2381"/>
+            </a:xfrm>
+            <a:prstGeom prst="line">
+              <a:avLst/>
+            </a:prstGeom>
+            <a:ln>
+              <a:prstDash val="dash"/>
+            </a:ln>
+          </p:spPr>
+          <p:style>
+            <a:lnRef idx="1">
+              <a:schemeClr val="accent1"/>
+            </a:lnRef>
+            <a:fillRef idx="0">
+              <a:schemeClr val="accent1"/>
+            </a:fillRef>
+            <a:effectRef idx="0">
+              <a:schemeClr val="accent1"/>
+            </a:effectRef>
+            <a:fontRef idx="minor">
+              <a:schemeClr val="tx1"/>
+            </a:fontRef>
+          </p:style>
+        </p:cxnSp>
+        <p:cxnSp>
+          <p:nvCxnSpPr>
+            <p:cNvPr id="193" name="Straight Connector 192"/>
+            <p:cNvCxnSpPr/>
+            <p:nvPr/>
+          </p:nvCxnSpPr>
+          <p:spPr>
+            <a:xfrm rot="5400000">
+              <a:off x="4535314" y="6285460"/>
+              <a:ext cx="820160" cy="2381"/>
+            </a:xfrm>
+            <a:prstGeom prst="line">
+              <a:avLst/>
+            </a:prstGeom>
+            <a:ln>
+              <a:prstDash val="dash"/>
+            </a:ln>
+          </p:spPr>
+          <p:style>
+            <a:lnRef idx="1">
+              <a:schemeClr val="accent1"/>
+            </a:lnRef>
+            <a:fillRef idx="0">
+              <a:schemeClr val="accent1"/>
+            </a:fillRef>
+            <a:effectRef idx="0">
+              <a:schemeClr val="accent1"/>
+            </a:effectRef>
+            <a:fontRef idx="minor">
+              <a:schemeClr val="tx1"/>
+            </a:fontRef>
+          </p:style>
+        </p:cxnSp>
+        <p:cxnSp>
+          <p:nvCxnSpPr>
+            <p:cNvPr id="194" name="Straight Arrow Connector 193"/>
+            <p:cNvCxnSpPr/>
+            <p:nvPr/>
+          </p:nvCxnSpPr>
+          <p:spPr>
+            <a:xfrm rot="5400000" flipH="1">
+              <a:off x="5366489" y="6186092"/>
+              <a:ext cx="10288" cy="838200"/>
+            </a:xfrm>
+            <a:prstGeom prst="straightConnector1">
+              <a:avLst/>
+            </a:prstGeom>
+            <a:ln>
+              <a:headEnd type="triangle"/>
+              <a:tailEnd type="triangle"/>
+            </a:ln>
+          </p:spPr>
+          <p:style>
+            <a:lnRef idx="1">
+              <a:schemeClr val="accent1"/>
+            </a:lnRef>
+            <a:fillRef idx="0">
+              <a:schemeClr val="accent1"/>
+            </a:fillRef>
+            <a:effectRef idx="0">
+              <a:schemeClr val="accent1"/>
+            </a:effectRef>
+            <a:fontRef idx="minor">
+              <a:schemeClr val="tx1"/>
+            </a:fontRef>
+          </p:style>
+        </p:cxnSp>
+        <p:sp>
+          <p:nvSpPr>
+            <p:cNvPr id="195" name="TextBox 194"/>
+            <p:cNvSpPr txBox="1"/>
+            <p:nvPr/>
+          </p:nvSpPr>
+          <p:spPr>
+            <a:xfrm>
+              <a:off x="4948836" y="6610336"/>
+              <a:ext cx="841897" cy="246221"/>
+            </a:xfrm>
+            <a:prstGeom prst="rect">
+              <a:avLst/>
+            </a:prstGeom>
+            <a:noFill/>
+          </p:spPr>
+          <p:txBody>
+            <a:bodyPr wrap="none" rtlCol="0">
+              <a:spAutoFit/>
+            </a:bodyPr>
+            <a:lstStyle/>
+            <a:p>
+              <a:r>
+                <a:rPr lang="en-US" sz="1000" dirty="0" smtClean="0"/>
+                <a:t>Visual Width</a:t>
+              </a:r>
+            </a:p>
+          </p:txBody>
+        </p:sp>
+        <p:sp>
+          <p:nvSpPr>
+            <p:cNvPr id="196" name="TextBox 195"/>
+            <p:cNvSpPr txBox="1"/>
+            <p:nvPr/>
+          </p:nvSpPr>
+          <p:spPr>
+            <a:xfrm rot="-2700000">
+              <a:off x="4606379" y="5396553"/>
+              <a:ext cx="862737" cy="246221"/>
+            </a:xfrm>
+            <a:prstGeom prst="rect">
+              <a:avLst/>
+            </a:prstGeom>
+            <a:noFill/>
+          </p:spPr>
+          <p:txBody>
+            <a:bodyPr wrap="none" rtlCol="0">
+              <a:spAutoFit/>
+            </a:bodyPr>
+            <a:lstStyle/>
+            <a:p>
+              <a:r>
+                <a:rPr lang="en-US" sz="1000" dirty="0" smtClean="0"/>
+                <a:t>Actual Width</a:t>
+              </a:r>
+              <a:endParaRPr lang="en-US" sz="1000" dirty="0"/>
+            </a:p>
+          </p:txBody>
+        </p:sp>
+      </p:grpSp>
+    </p:spTree>
+    <p:extLst>
+      <p:ext uri="{BB962C8B-B14F-4D97-AF65-F5344CB8AC3E}">
+        <p14:creationId xmlns:p14="http://schemas.microsoft.com/office/powerpoint/2010/main" val="445095344"/>
+      </p:ext>
+    </p:extLst>
+  </p:cSld>
+  <p:clrMapOvr>
+    <a:masterClrMapping/>
+  </p:clrMapOvr>
+</p:sld>
+</file>
+
+<file path=ppt/slides/slide32.xml><?xml version="1.0" encoding="utf-8"?>
+<p:sld xmlns:a="http://schemas.openxmlformats.org/drawingml/2006/main" xmlns:r="http://schemas.openxmlformats.org/officeDocument/2006/relationships" xmlns:p="http://schemas.openxmlformats.org/presentationml/2006/main">
+  <p:cSld>
+    <p:spTree>
+      <p:nvGrpSpPr>
+        <p:cNvPr id="1" name=""/>
+        <p:cNvGrpSpPr/>
+        <p:nvPr/>
+      </p:nvGrpSpPr>
+      <p:grpSpPr>
+        <a:xfrm>
+          <a:off x="0" y="0"/>
+          <a:ext cx="0" cy="0"/>
+          <a:chOff x="0" y="0"/>
+          <a:chExt cx="0" cy="0"/>
+        </a:xfrm>
+      </p:grpSpPr>
+      <p:sp>
+        <p:nvSpPr>
+          <p:cNvPr id="10" name="Oval 9"/>
+          <p:cNvSpPr>
+            <a:spLocks/>
+          </p:cNvSpPr>
+          <p:nvPr/>
+        </p:nvSpPr>
+        <p:spPr>
+          <a:xfrm rot="2700000">
+            <a:off x="2961122" y="3228486"/>
+            <a:ext cx="914400" cy="914400"/>
+          </a:xfrm>
+          <a:prstGeom prst="ellipse">
             <a:avLst/>
           </a:prstGeom>
           <a:solidFill>
@@ -15351,6 +16069,168 @@
       </p:sp>
       <p:sp>
         <p:nvSpPr>
+          <p:cNvPr id="11" name="Left Arrow 10"/>
+          <p:cNvSpPr/>
+          <p:nvPr/>
+        </p:nvSpPr>
+        <p:spPr>
+          <a:xfrm rot="2726086">
+            <a:off x="2220673" y="2550673"/>
+            <a:ext cx="958450" cy="811203"/>
+          </a:xfrm>
+          <a:prstGeom prst="leftArrow">
+            <a:avLst/>
+          </a:prstGeom>
+          <a:solidFill>
+            <a:srgbClr val="0070C0"/>
+          </a:solidFill>
+          <a:ln w="28575">
+            <a:solidFill>
+              <a:srgbClr val="FFFFFF"/>
+            </a:solidFill>
+          </a:ln>
+          <a:effectLst/>
+          <a:scene3d>
+            <a:camera prst="orthographicFront"/>
+            <a:lightRig rig="balanced" dir="t"/>
+          </a:scene3d>
+          <a:sp3d/>
+        </p:spPr>
+        <p:style>
+          <a:lnRef idx="2">
+            <a:schemeClr val="accent1">
+              <a:shade val="50000"/>
+            </a:schemeClr>
+          </a:lnRef>
+          <a:fillRef idx="1">
+            <a:schemeClr val="accent1"/>
+          </a:fillRef>
+          <a:effectRef idx="0">
+            <a:schemeClr val="accent1"/>
+          </a:effectRef>
+          <a:fontRef idx="minor">
+            <a:schemeClr val="lt1"/>
+          </a:fontRef>
+        </p:style>
+        <p:txBody>
+          <a:bodyPr rtlCol="0" anchor="ctr"/>
+          <a:lstStyle/>
+          <a:p>
+            <a:pPr algn="ctr"/>
+            <a:endParaRPr lang="en-US"/>
+          </a:p>
+        </p:txBody>
+      </p:sp>
+      <p:sp>
+        <p:nvSpPr>
+          <p:cNvPr id="13" name="Left Arrow 12"/>
+          <p:cNvSpPr/>
+          <p:nvPr/>
+        </p:nvSpPr>
+        <p:spPr>
+          <a:xfrm rot="8126086">
+            <a:off x="3668505" y="2561659"/>
+            <a:ext cx="958450" cy="811203"/>
+          </a:xfrm>
+          <a:prstGeom prst="leftArrow">
+            <a:avLst/>
+          </a:prstGeom>
+          <a:solidFill>
+            <a:srgbClr val="0070C0"/>
+          </a:solidFill>
+          <a:ln w="28575">
+            <a:solidFill>
+              <a:srgbClr val="FFFFFF"/>
+            </a:solidFill>
+          </a:ln>
+          <a:effectLst/>
+          <a:scene3d>
+            <a:camera prst="orthographicFront"/>
+            <a:lightRig rig="balanced" dir="t"/>
+          </a:scene3d>
+          <a:sp3d/>
+        </p:spPr>
+        <p:style>
+          <a:lnRef idx="2">
+            <a:schemeClr val="accent1">
+              <a:shade val="50000"/>
+            </a:schemeClr>
+          </a:lnRef>
+          <a:fillRef idx="1">
+            <a:schemeClr val="accent1"/>
+          </a:fillRef>
+          <a:effectRef idx="0">
+            <a:schemeClr val="accent1"/>
+          </a:effectRef>
+          <a:fontRef idx="minor">
+            <a:schemeClr val="lt1"/>
+          </a:fontRef>
+        </p:style>
+        <p:txBody>
+          <a:bodyPr rtlCol="0" anchor="ctr"/>
+          <a:lstStyle/>
+          <a:p>
+            <a:pPr algn="ctr"/>
+            <a:endParaRPr lang="en-US"/>
+          </a:p>
+        </p:txBody>
+      </p:sp>
+      <p:sp>
+        <p:nvSpPr>
+          <p:cNvPr id="14" name="Left Arrow 13"/>
+          <p:cNvSpPr/>
+          <p:nvPr/>
+        </p:nvSpPr>
+        <p:spPr>
+          <a:xfrm rot="13526086">
+            <a:off x="3657518" y="4009492"/>
+            <a:ext cx="958450" cy="811203"/>
+          </a:xfrm>
+          <a:prstGeom prst="leftArrow">
+            <a:avLst/>
+          </a:prstGeom>
+          <a:solidFill>
+            <a:srgbClr val="0070C0"/>
+          </a:solidFill>
+          <a:ln w="28575">
+            <a:solidFill>
+              <a:srgbClr val="FFFFFF"/>
+            </a:solidFill>
+          </a:ln>
+          <a:effectLst/>
+          <a:scene3d>
+            <a:camera prst="orthographicFront"/>
+            <a:lightRig rig="balanced" dir="t"/>
+          </a:scene3d>
+          <a:sp3d/>
+        </p:spPr>
+        <p:style>
+          <a:lnRef idx="2">
+            <a:schemeClr val="accent1">
+              <a:shade val="50000"/>
+            </a:schemeClr>
+          </a:lnRef>
+          <a:fillRef idx="1">
+            <a:schemeClr val="accent1"/>
+          </a:fillRef>
+          <a:effectRef idx="0">
+            <a:schemeClr val="accent1"/>
+          </a:effectRef>
+          <a:fontRef idx="minor">
+            <a:schemeClr val="lt1"/>
+          </a:fontRef>
+        </p:style>
+        <p:txBody>
+          <a:bodyPr rtlCol="0" anchor="ctr"/>
+          <a:lstStyle/>
+          <a:p>
+            <a:pPr algn="ctr"/>
+            <a:endParaRPr lang="en-US"/>
+          </a:p>
+        </p:txBody>
+      </p:sp>
+      <p:sp>
+        <p:nvSpPr>
           <p:cNvPr id="15" name="Left Arrow 14"/>
           <p:cNvSpPr/>
           <p:nvPr/>
@@ -15366,9 +16246,9 @@
           <a:solidFill>
             <a:srgbClr val="0070C0"/>
           </a:solidFill>
-          <a:ln>
+          <a:ln w="28575">
             <a:solidFill>
-              <a:srgbClr val="0070C0"/>
+              <a:srgbClr val="FFFFFF"/>
             </a:solidFill>
           </a:ln>
           <a:effectLst/>
@@ -15849,9 +16729,9 @@
           <a:solidFill>
             <a:srgbClr val="0070C0"/>
           </a:solidFill>
-          <a:ln>
+          <a:ln w="28575">
             <a:solidFill>
-              <a:srgbClr val="0070C0"/>
+              <a:srgbClr val="FFFFFF"/>
             </a:solidFill>
           </a:ln>
           <a:effectLst/>
@@ -16140,9 +17020,9 @@
           <a:solidFill>
             <a:srgbClr val="0070C0"/>
           </a:solidFill>
-          <a:ln>
+          <a:ln w="28575">
             <a:solidFill>
-              <a:srgbClr val="0070C0"/>
+              <a:srgbClr val="FFFFFF"/>
             </a:solidFill>
           </a:ln>
           <a:effectLst/>
@@ -16431,9 +17311,9 @@
           <a:solidFill>
             <a:srgbClr val="0070C0"/>
           </a:solidFill>
-          <a:ln>
+          <a:ln w="28575">
             <a:solidFill>
-              <a:srgbClr val="0070C0"/>
+              <a:srgbClr val="FFFFFF"/>
             </a:solidFill>
           </a:ln>
           <a:effectLst/>
@@ -16722,9 +17602,9 @@
           <a:solidFill>
             <a:srgbClr val="0070C0"/>
           </a:solidFill>
-          <a:ln>
+          <a:ln w="28575">
             <a:solidFill>
-              <a:srgbClr val="0070C0"/>
+              <a:srgbClr val="FFFFFF"/>
             </a:solidFill>
           </a:ln>
           <a:effectLst/>
@@ -16832,9 +17712,9 @@
           <a:solidFill>
             <a:srgbClr val="0070C0"/>
           </a:solidFill>
-          <a:ln>
+          <a:ln w="28575">
             <a:solidFill>
-              <a:srgbClr val="0070C0"/>
+              <a:srgbClr val="FFFFFF"/>
             </a:solidFill>
           </a:ln>
           <a:effectLst/>
@@ -16886,9 +17766,9 @@
           <a:solidFill>
             <a:srgbClr val="0070C0"/>
           </a:solidFill>
-          <a:ln>
+          <a:ln w="28575">
             <a:solidFill>
-              <a:srgbClr val="0070C0"/>
+              <a:srgbClr val="FFFFFF"/>
             </a:solidFill>
           </a:ln>
           <a:effectLst/>
@@ -16940,9 +17820,9 @@
           <a:solidFill>
             <a:srgbClr val="0070C0"/>
           </a:solidFill>
-          <a:ln>
+          <a:ln w="28575">
             <a:solidFill>
-              <a:srgbClr val="0070C0"/>
+              <a:srgbClr val="FFFFFF"/>
             </a:solidFill>
           </a:ln>
           <a:effectLst/>
@@ -16994,9 +17874,9 @@
           <a:solidFill>
             <a:srgbClr val="0070C0"/>
           </a:solidFill>
-          <a:ln>
+          <a:ln w="28575">
             <a:solidFill>
-              <a:srgbClr val="0070C0"/>
+              <a:srgbClr val="FFFFFF"/>
             </a:solidFill>
           </a:ln>
           <a:effectLst/>
@@ -17031,530 +17911,6 @@
           </a:p>
         </p:txBody>
       </p:sp>
-      <p:grpSp>
-        <p:nvGrpSpPr>
-          <p:cNvPr id="20" name="Group 19"/>
-          <p:cNvGrpSpPr/>
-          <p:nvPr/>
-        </p:nvGrpSpPr>
-        <p:grpSpPr>
-          <a:xfrm>
-            <a:off x="9620630" y="1482509"/>
-            <a:ext cx="2231786" cy="1460464"/>
-            <a:chOff x="153477" y="4877083"/>
-            <a:chExt cx="2231786" cy="1460464"/>
-          </a:xfrm>
-        </p:grpSpPr>
-        <p:sp>
-          <p:nvSpPr>
-            <p:cNvPr id="22" name="Left Arrow 21"/>
-            <p:cNvSpPr/>
-            <p:nvPr/>
-          </p:nvSpPr>
-          <p:spPr>
-            <a:xfrm rot="8126086">
-              <a:off x="1234752" y="5445556"/>
-              <a:ext cx="958450" cy="811203"/>
-            </a:xfrm>
-            <a:prstGeom prst="leftArrow">
-              <a:avLst/>
-            </a:prstGeom>
-            <a:solidFill>
-              <a:srgbClr val="0070C0"/>
-            </a:solidFill>
-            <a:ln>
-              <a:solidFill>
-                <a:srgbClr val="0070C0"/>
-              </a:solidFill>
-            </a:ln>
-            <a:effectLst/>
-            <a:scene3d>
-              <a:camera prst="orthographicFront"/>
-              <a:lightRig rig="balanced" dir="t"/>
-            </a:scene3d>
-            <a:sp3d/>
-          </p:spPr>
-          <p:style>
-            <a:lnRef idx="2">
-              <a:schemeClr val="accent1">
-                <a:shade val="50000"/>
-              </a:schemeClr>
-            </a:lnRef>
-            <a:fillRef idx="1">
-              <a:schemeClr val="accent1"/>
-            </a:fillRef>
-            <a:effectRef idx="0">
-              <a:schemeClr val="accent1"/>
-            </a:effectRef>
-            <a:fontRef idx="minor">
-              <a:schemeClr val="lt1"/>
-            </a:fontRef>
-          </p:style>
-          <p:txBody>
-            <a:bodyPr rtlCol="0" anchor="ctr"/>
-            <a:lstStyle/>
-            <a:p>
-              <a:pPr algn="ctr"/>
-              <a:endParaRPr lang="en-US"/>
-            </a:p>
-          </p:txBody>
-        </p:sp>
-        <p:cxnSp>
-          <p:nvCxnSpPr>
-            <p:cNvPr id="4" name="Straight Connector 3"/>
-            <p:cNvCxnSpPr/>
-            <p:nvPr/>
-          </p:nvCxnSpPr>
-          <p:spPr>
-            <a:xfrm>
-              <a:off x="925436" y="5504118"/>
-              <a:ext cx="820160" cy="2381"/>
-            </a:xfrm>
-            <a:prstGeom prst="line">
-              <a:avLst/>
-            </a:prstGeom>
-            <a:ln>
-              <a:prstDash val="dash"/>
-            </a:ln>
-          </p:spPr>
-          <p:style>
-            <a:lnRef idx="1">
-              <a:schemeClr val="accent1"/>
-            </a:lnRef>
-            <a:fillRef idx="0">
-              <a:schemeClr val="accent1"/>
-            </a:fillRef>
-            <a:effectRef idx="0">
-              <a:schemeClr val="accent1"/>
-            </a:effectRef>
-            <a:fontRef idx="minor">
-              <a:schemeClr val="tx1"/>
-            </a:fontRef>
-          </p:style>
-        </p:cxnSp>
-        <p:cxnSp>
-          <p:nvCxnSpPr>
-            <p:cNvPr id="28" name="Straight Connector 27"/>
-            <p:cNvCxnSpPr/>
-            <p:nvPr/>
-          </p:nvCxnSpPr>
-          <p:spPr>
-            <a:xfrm>
-              <a:off x="925436" y="6330395"/>
-              <a:ext cx="820160" cy="2381"/>
-            </a:xfrm>
-            <a:prstGeom prst="line">
-              <a:avLst/>
-            </a:prstGeom>
-            <a:ln>
-              <a:prstDash val="dash"/>
-            </a:ln>
-          </p:spPr>
-          <p:style>
-            <a:lnRef idx="1">
-              <a:schemeClr val="accent1"/>
-            </a:lnRef>
-            <a:fillRef idx="0">
-              <a:schemeClr val="accent1"/>
-            </a:fillRef>
-            <a:effectRef idx="0">
-              <a:schemeClr val="accent1"/>
-            </a:effectRef>
-            <a:fontRef idx="minor">
-              <a:schemeClr val="tx1"/>
-            </a:fontRef>
-          </p:style>
-        </p:cxnSp>
-        <p:cxnSp>
-          <p:nvCxnSpPr>
-            <p:cNvPr id="9" name="Straight Arrow Connector 8"/>
-            <p:cNvCxnSpPr/>
-            <p:nvPr/>
-          </p:nvCxnSpPr>
-          <p:spPr>
-            <a:xfrm flipH="1">
-              <a:off x="1009132" y="5499347"/>
-              <a:ext cx="10288" cy="838200"/>
-            </a:xfrm>
-            <a:prstGeom prst="straightConnector1">
-              <a:avLst/>
-            </a:prstGeom>
-            <a:ln>
-              <a:headEnd type="triangle"/>
-              <a:tailEnd type="triangle"/>
-            </a:ln>
-          </p:spPr>
-          <p:style>
-            <a:lnRef idx="1">
-              <a:schemeClr val="accent1"/>
-            </a:lnRef>
-            <a:fillRef idx="0">
-              <a:schemeClr val="accent1"/>
-            </a:fillRef>
-            <a:effectRef idx="0">
-              <a:schemeClr val="accent1"/>
-            </a:effectRef>
-            <a:fontRef idx="minor">
-              <a:schemeClr val="tx1"/>
-            </a:fontRef>
-          </p:style>
-        </p:cxnSp>
-        <p:sp>
-          <p:nvSpPr>
-            <p:cNvPr id="17" name="TextBox 16"/>
-            <p:cNvSpPr txBox="1"/>
-            <p:nvPr/>
-          </p:nvSpPr>
-          <p:spPr>
-            <a:xfrm>
-              <a:off x="153477" y="5799132"/>
-              <a:ext cx="865943" cy="246221"/>
-            </a:xfrm>
-            <a:prstGeom prst="rect">
-              <a:avLst/>
-            </a:prstGeom>
-            <a:noFill/>
-          </p:spPr>
-          <p:txBody>
-            <a:bodyPr wrap="none" rtlCol="0">
-              <a:spAutoFit/>
-            </a:bodyPr>
-            <a:lstStyle/>
-            <a:p>
-              <a:r>
-                <a:rPr lang="en-US" sz="1000" dirty="0" smtClean="0"/>
-                <a:t>Visual Height</a:t>
-              </a:r>
-            </a:p>
-          </p:txBody>
-        </p:sp>
-        <p:sp>
-          <p:nvSpPr>
-            <p:cNvPr id="18" name="TextBox 17"/>
-            <p:cNvSpPr txBox="1"/>
-            <p:nvPr/>
-          </p:nvSpPr>
-          <p:spPr>
-            <a:xfrm rot="2700000">
-              <a:off x="1797281" y="5211149"/>
-              <a:ext cx="922047" cy="253916"/>
-            </a:xfrm>
-            <a:prstGeom prst="rect">
-              <a:avLst/>
-            </a:prstGeom>
-            <a:noFill/>
-          </p:spPr>
-          <p:txBody>
-            <a:bodyPr wrap="none" rtlCol="0">
-              <a:spAutoFit/>
-            </a:bodyPr>
-            <a:lstStyle/>
-            <a:p>
-              <a:r>
-                <a:rPr lang="en-US" sz="1000" dirty="0" smtClean="0"/>
-                <a:t>Actual Height</a:t>
-              </a:r>
-              <a:endParaRPr lang="en-US" sz="1000" dirty="0"/>
-            </a:p>
-          </p:txBody>
-        </p:sp>
-        <p:cxnSp>
-          <p:nvCxnSpPr>
-            <p:cNvPr id="44" name="Straight Arrow Connector 43"/>
-            <p:cNvCxnSpPr/>
-            <p:nvPr/>
-          </p:nvCxnSpPr>
-          <p:spPr>
-            <a:xfrm rot="-2700000" flipH="1">
-              <a:off x="2129819" y="5028991"/>
-              <a:ext cx="10288" cy="838200"/>
-            </a:xfrm>
-            <a:prstGeom prst="straightConnector1">
-              <a:avLst/>
-            </a:prstGeom>
-            <a:ln>
-              <a:headEnd type="triangle"/>
-              <a:tailEnd type="triangle"/>
-            </a:ln>
-          </p:spPr>
-          <p:style>
-            <a:lnRef idx="1">
-              <a:schemeClr val="accent1"/>
-            </a:lnRef>
-            <a:fillRef idx="0">
-              <a:schemeClr val="accent1"/>
-            </a:fillRef>
-            <a:effectRef idx="0">
-              <a:schemeClr val="accent1"/>
-            </a:effectRef>
-            <a:fontRef idx="minor">
-              <a:schemeClr val="tx1"/>
-            </a:fontRef>
-          </p:style>
-        </p:cxnSp>
-      </p:grpSp>
-      <p:grpSp>
-        <p:nvGrpSpPr>
-          <p:cNvPr id="19" name="Group 18"/>
-          <p:cNvGrpSpPr/>
-          <p:nvPr/>
-        </p:nvGrpSpPr>
-        <p:grpSpPr>
-          <a:xfrm>
-            <a:off x="10329827" y="4101020"/>
-            <a:ext cx="1326426" cy="1460004"/>
-            <a:chOff x="4606379" y="5396553"/>
-            <a:chExt cx="1326426" cy="1460004"/>
-          </a:xfrm>
-        </p:grpSpPr>
-        <p:cxnSp>
-          <p:nvCxnSpPr>
-            <p:cNvPr id="37" name="Straight Arrow Connector 36"/>
-            <p:cNvCxnSpPr/>
-            <p:nvPr/>
-          </p:nvCxnSpPr>
-          <p:spPr>
-            <a:xfrm rot="2700000" flipH="1">
-              <a:off x="5106898" y="5147435"/>
-              <a:ext cx="10288" cy="952500"/>
-            </a:xfrm>
-            <a:prstGeom prst="straightConnector1">
-              <a:avLst/>
-            </a:prstGeom>
-            <a:ln>
-              <a:headEnd type="triangle"/>
-              <a:tailEnd type="triangle"/>
-            </a:ln>
-          </p:spPr>
-          <p:style>
-            <a:lnRef idx="1">
-              <a:schemeClr val="accent1"/>
-            </a:lnRef>
-            <a:fillRef idx="0">
-              <a:schemeClr val="accent1"/>
-            </a:fillRef>
-            <a:effectRef idx="0">
-              <a:schemeClr val="accent1"/>
-            </a:effectRef>
-            <a:fontRef idx="minor">
-              <a:schemeClr val="tx1"/>
-            </a:fontRef>
-          </p:style>
-        </p:cxnSp>
-        <p:sp>
-          <p:nvSpPr>
-            <p:cNvPr id="45" name="Left Arrow 44"/>
-            <p:cNvSpPr/>
-            <p:nvPr/>
-          </p:nvSpPr>
-          <p:spPr>
-            <a:xfrm rot="8126086">
-              <a:off x="4974355" y="5572534"/>
-              <a:ext cx="958450" cy="811203"/>
-            </a:xfrm>
-            <a:prstGeom prst="leftArrow">
-              <a:avLst/>
-            </a:prstGeom>
-            <a:solidFill>
-              <a:srgbClr val="0070C0"/>
-            </a:solidFill>
-            <a:ln>
-              <a:solidFill>
-                <a:srgbClr val="0070C0"/>
-              </a:solidFill>
-            </a:ln>
-            <a:effectLst/>
-            <a:scene3d>
-              <a:camera prst="orthographicFront"/>
-              <a:lightRig rig="balanced" dir="t"/>
-            </a:scene3d>
-            <a:sp3d/>
-          </p:spPr>
-          <p:style>
-            <a:lnRef idx="2">
-              <a:schemeClr val="accent1">
-                <a:shade val="50000"/>
-              </a:schemeClr>
-            </a:lnRef>
-            <a:fillRef idx="1">
-              <a:schemeClr val="accent1"/>
-            </a:fillRef>
-            <a:effectRef idx="0">
-              <a:schemeClr val="accent1"/>
-            </a:effectRef>
-            <a:fontRef idx="minor">
-              <a:schemeClr val="lt1"/>
-            </a:fontRef>
-          </p:style>
-          <p:txBody>
-            <a:bodyPr rtlCol="0" anchor="ctr"/>
-            <a:lstStyle/>
-            <a:p>
-              <a:pPr algn="ctr"/>
-              <a:endParaRPr lang="en-US"/>
-            </a:p>
-          </p:txBody>
-        </p:sp>
-        <p:cxnSp>
-          <p:nvCxnSpPr>
-            <p:cNvPr id="46" name="Straight Connector 45"/>
-            <p:cNvCxnSpPr/>
-            <p:nvPr/>
-          </p:nvCxnSpPr>
-          <p:spPr>
-            <a:xfrm rot="5400000">
-              <a:off x="5388172" y="6285460"/>
-              <a:ext cx="820160" cy="2381"/>
-            </a:xfrm>
-            <a:prstGeom prst="line">
-              <a:avLst/>
-            </a:prstGeom>
-            <a:ln>
-              <a:prstDash val="dash"/>
-            </a:ln>
-          </p:spPr>
-          <p:style>
-            <a:lnRef idx="1">
-              <a:schemeClr val="accent1"/>
-            </a:lnRef>
-            <a:fillRef idx="0">
-              <a:schemeClr val="accent1"/>
-            </a:fillRef>
-            <a:effectRef idx="0">
-              <a:schemeClr val="accent1"/>
-            </a:effectRef>
-            <a:fontRef idx="minor">
-              <a:schemeClr val="tx1"/>
-            </a:fontRef>
-          </p:style>
-        </p:cxnSp>
-        <p:cxnSp>
-          <p:nvCxnSpPr>
-            <p:cNvPr id="47" name="Straight Connector 46"/>
-            <p:cNvCxnSpPr/>
-            <p:nvPr/>
-          </p:nvCxnSpPr>
-          <p:spPr>
-            <a:xfrm rot="5400000">
-              <a:off x="4535314" y="6285460"/>
-              <a:ext cx="820160" cy="2381"/>
-            </a:xfrm>
-            <a:prstGeom prst="line">
-              <a:avLst/>
-            </a:prstGeom>
-            <a:ln>
-              <a:prstDash val="dash"/>
-            </a:ln>
-          </p:spPr>
-          <p:style>
-            <a:lnRef idx="1">
-              <a:schemeClr val="accent1"/>
-            </a:lnRef>
-            <a:fillRef idx="0">
-              <a:schemeClr val="accent1"/>
-            </a:fillRef>
-            <a:effectRef idx="0">
-              <a:schemeClr val="accent1"/>
-            </a:effectRef>
-            <a:fontRef idx="minor">
-              <a:schemeClr val="tx1"/>
-            </a:fontRef>
-          </p:style>
-        </p:cxnSp>
-        <p:cxnSp>
-          <p:nvCxnSpPr>
-            <p:cNvPr id="48" name="Straight Arrow Connector 47"/>
-            <p:cNvCxnSpPr/>
-            <p:nvPr/>
-          </p:nvCxnSpPr>
-          <p:spPr>
-            <a:xfrm rot="5400000" flipH="1">
-              <a:off x="5366489" y="6186092"/>
-              <a:ext cx="10288" cy="838200"/>
-            </a:xfrm>
-            <a:prstGeom prst="straightConnector1">
-              <a:avLst/>
-            </a:prstGeom>
-            <a:ln>
-              <a:headEnd type="triangle"/>
-              <a:tailEnd type="triangle"/>
-            </a:ln>
-          </p:spPr>
-          <p:style>
-            <a:lnRef idx="1">
-              <a:schemeClr val="accent1"/>
-            </a:lnRef>
-            <a:fillRef idx="0">
-              <a:schemeClr val="accent1"/>
-            </a:fillRef>
-            <a:effectRef idx="0">
-              <a:schemeClr val="accent1"/>
-            </a:effectRef>
-            <a:fontRef idx="minor">
-              <a:schemeClr val="tx1"/>
-            </a:fontRef>
-          </p:style>
-        </p:cxnSp>
-        <p:sp>
-          <p:nvSpPr>
-            <p:cNvPr id="49" name="TextBox 48"/>
-            <p:cNvSpPr txBox="1"/>
-            <p:nvPr/>
-          </p:nvSpPr>
-          <p:spPr>
-            <a:xfrm>
-              <a:off x="4948836" y="6610336"/>
-              <a:ext cx="841897" cy="246221"/>
-            </a:xfrm>
-            <a:prstGeom prst="rect">
-              <a:avLst/>
-            </a:prstGeom>
-            <a:noFill/>
-          </p:spPr>
-          <p:txBody>
-            <a:bodyPr wrap="none" rtlCol="0">
-              <a:spAutoFit/>
-            </a:bodyPr>
-            <a:lstStyle/>
-            <a:p>
-              <a:r>
-                <a:rPr lang="en-US" sz="1000" dirty="0" smtClean="0"/>
-                <a:t>Visual Width</a:t>
-              </a:r>
-            </a:p>
-          </p:txBody>
-        </p:sp>
-        <p:sp>
-          <p:nvSpPr>
-            <p:cNvPr id="50" name="TextBox 49"/>
-            <p:cNvSpPr txBox="1"/>
-            <p:nvPr/>
-          </p:nvSpPr>
-          <p:spPr>
-            <a:xfrm rot="-2700000">
-              <a:off x="4606379" y="5396553"/>
-              <a:ext cx="862737" cy="246221"/>
-            </a:xfrm>
-            <a:prstGeom prst="rect">
-              <a:avLst/>
-            </a:prstGeom>
-            <a:noFill/>
-          </p:spPr>
-          <p:txBody>
-            <a:bodyPr wrap="none" rtlCol="0">
-              <a:spAutoFit/>
-            </a:bodyPr>
-            <a:lstStyle/>
-            <a:p>
-              <a:r>
-                <a:rPr lang="en-US" sz="1000" dirty="0" smtClean="0"/>
-                <a:t>Actual Width</a:t>
-              </a:r>
-              <a:endParaRPr lang="en-US" sz="1000" dirty="0"/>
-            </a:p>
-          </p:txBody>
-        </p:sp>
-      </p:grpSp>
     </p:spTree>
     <p:extLst>
       <p:ext uri="{BB962C8B-B14F-4D97-AF65-F5344CB8AC3E}">
@@ -17568,7 +17924,7 @@
 </p:sld>
 </file>
 
-<file path=ppt/slides/slide32.xml><?xml version="1.0" encoding="utf-8"?>
+<file path=ppt/slides/slide33.xml><?xml version="1.0" encoding="utf-8"?>
 <p:sld xmlns:a="http://schemas.openxmlformats.org/drawingml/2006/main" xmlns:r="http://schemas.openxmlformats.org/officeDocument/2006/relationships" xmlns:p="http://schemas.openxmlformats.org/presentationml/2006/main">
   <p:cSld>
     <p:spTree>

</xml_diff>